<commit_message>
report and ppt added
</commit_message>
<xml_diff>
--- a/spring-2019/3/report/skandag_sumish_DRM_PPT.pptx
+++ b/spring-2019/3/report/skandag_sumish_DRM_PPT.pptx
@@ -1229,6 +1229,442 @@
       <dsp:cNvGrpSpPr/>
     </dsp:nvGrpSpPr>
     <dsp:grpSpPr/>
+    <dsp:sp modelId="{F876CFDF-1C88-1B4A-8E16-40571C14BD3D}">
+      <dsp:nvSpPr>
+        <dsp:cNvPr id="0" name=""/>
+        <dsp:cNvSpPr/>
+      </dsp:nvSpPr>
+      <dsp:spPr>
+        <a:xfrm>
+          <a:off x="0" y="0"/>
+          <a:ext cx="6116795" cy="0"/>
+        </a:xfrm>
+        <a:prstGeom prst="line">
+          <a:avLst/>
+        </a:prstGeom>
+        <a:solidFill>
+          <a:schemeClr val="accent2">
+            <a:hueOff val="0"/>
+            <a:satOff val="0"/>
+            <a:lumOff val="0"/>
+            <a:alphaOff val="0"/>
+          </a:schemeClr>
+        </a:solidFill>
+        <a:ln w="19050" cap="rnd" cmpd="sng" algn="ctr">
+          <a:solidFill>
+            <a:schemeClr val="accent2">
+              <a:hueOff val="0"/>
+              <a:satOff val="0"/>
+              <a:lumOff val="0"/>
+              <a:alphaOff val="0"/>
+            </a:schemeClr>
+          </a:solidFill>
+          <a:prstDash val="solid"/>
+        </a:ln>
+        <a:effectLst/>
+      </dsp:spPr>
+      <dsp:style>
+        <a:lnRef idx="2">
+          <a:scrgbClr r="0" g="0" b="0"/>
+        </a:lnRef>
+        <a:fillRef idx="1">
+          <a:scrgbClr r="0" g="0" b="0"/>
+        </a:fillRef>
+        <a:effectRef idx="0">
+          <a:scrgbClr r="0" g="0" b="0"/>
+        </a:effectRef>
+        <a:fontRef idx="minor">
+          <a:schemeClr val="lt1"/>
+        </a:fontRef>
+      </dsp:style>
+    </dsp:sp>
+    <dsp:sp modelId="{676C96C9-90EE-9A45-9BA6-5692FA3E3CFD}">
+      <dsp:nvSpPr>
+        <dsp:cNvPr id="0" name=""/>
+        <dsp:cNvSpPr/>
+      </dsp:nvSpPr>
+      <dsp:spPr>
+        <a:xfrm>
+          <a:off x="0" y="0"/>
+          <a:ext cx="6116795" cy="1232182"/>
+        </a:xfrm>
+        <a:prstGeom prst="rect">
+          <a:avLst/>
+        </a:prstGeom>
+        <a:noFill/>
+        <a:ln>
+          <a:noFill/>
+        </a:ln>
+        <a:effectLst/>
+      </dsp:spPr>
+      <dsp:style>
+        <a:lnRef idx="0">
+          <a:scrgbClr r="0" g="0" b="0"/>
+        </a:lnRef>
+        <a:fillRef idx="0">
+          <a:scrgbClr r="0" g="0" b="0"/>
+        </a:fillRef>
+        <a:effectRef idx="0">
+          <a:scrgbClr r="0" g="0" b="0"/>
+        </a:effectRef>
+        <a:fontRef idx="minor"/>
+      </dsp:style>
+      <dsp:txBody>
+        <a:bodyPr spcFirstLastPara="0" vert="horz" wrap="square" lIns="102870" tIns="102870" rIns="102870" bIns="102870" numCol="1" spcCol="1270" anchor="t" anchorCtr="0">
+          <a:noAutofit/>
+        </a:bodyPr>
+        <a:lstStyle/>
+        <a:p>
+          <a:pPr lvl="0" algn="l" defTabSz="1200150">
+            <a:lnSpc>
+              <a:spcPct val="90000"/>
+            </a:lnSpc>
+            <a:spcBef>
+              <a:spcPct val="0"/>
+            </a:spcBef>
+            <a:spcAft>
+              <a:spcPct val="35000"/>
+            </a:spcAft>
+          </a:pPr>
+          <a:r>
+            <a:rPr lang="en-US" sz="2700" b="0" i="0" kern="1200"/>
+            <a:t>Implementation of parallized forest using spark on multiple nodes. </a:t>
+          </a:r>
+          <a:endParaRPr lang="en-US" sz="2700" kern="1200"/>
+        </a:p>
+      </dsp:txBody>
+      <dsp:txXfrm>
+        <a:off x="0" y="0"/>
+        <a:ext cx="6116795" cy="1232182"/>
+      </dsp:txXfrm>
+    </dsp:sp>
+    <dsp:sp modelId="{EBDB7942-1E4A-4947-890C-D099C0E6E28C}">
+      <dsp:nvSpPr>
+        <dsp:cNvPr id="0" name=""/>
+        <dsp:cNvSpPr/>
+      </dsp:nvSpPr>
+      <dsp:spPr>
+        <a:xfrm>
+          <a:off x="0" y="1232181"/>
+          <a:ext cx="6116795" cy="0"/>
+        </a:xfrm>
+        <a:prstGeom prst="line">
+          <a:avLst/>
+        </a:prstGeom>
+        <a:solidFill>
+          <a:schemeClr val="accent2">
+            <a:hueOff val="-6588574"/>
+            <a:satOff val="300"/>
+            <a:lumOff val="0"/>
+            <a:alphaOff val="0"/>
+          </a:schemeClr>
+        </a:solidFill>
+        <a:ln w="19050" cap="rnd" cmpd="sng" algn="ctr">
+          <a:solidFill>
+            <a:schemeClr val="accent2">
+              <a:hueOff val="-6588574"/>
+              <a:satOff val="300"/>
+              <a:lumOff val="0"/>
+              <a:alphaOff val="0"/>
+            </a:schemeClr>
+          </a:solidFill>
+          <a:prstDash val="solid"/>
+        </a:ln>
+        <a:effectLst/>
+      </dsp:spPr>
+      <dsp:style>
+        <a:lnRef idx="2">
+          <a:scrgbClr r="0" g="0" b="0"/>
+        </a:lnRef>
+        <a:fillRef idx="1">
+          <a:scrgbClr r="0" g="0" b="0"/>
+        </a:fillRef>
+        <a:effectRef idx="0">
+          <a:scrgbClr r="0" g="0" b="0"/>
+        </a:effectRef>
+        <a:fontRef idx="minor">
+          <a:schemeClr val="lt1"/>
+        </a:fontRef>
+      </dsp:style>
+    </dsp:sp>
+    <dsp:sp modelId="{736CAD82-A059-6F41-A9E5-8D6D2BEC750E}">
+      <dsp:nvSpPr>
+        <dsp:cNvPr id="0" name=""/>
+        <dsp:cNvSpPr/>
+      </dsp:nvSpPr>
+      <dsp:spPr>
+        <a:xfrm>
+          <a:off x="0" y="1232182"/>
+          <a:ext cx="6116795" cy="1232182"/>
+        </a:xfrm>
+        <a:prstGeom prst="rect">
+          <a:avLst/>
+        </a:prstGeom>
+        <a:noFill/>
+        <a:ln>
+          <a:noFill/>
+        </a:ln>
+        <a:effectLst/>
+      </dsp:spPr>
+      <dsp:style>
+        <a:lnRef idx="0">
+          <a:scrgbClr r="0" g="0" b="0"/>
+        </a:lnRef>
+        <a:fillRef idx="0">
+          <a:scrgbClr r="0" g="0" b="0"/>
+        </a:fillRef>
+        <a:effectRef idx="0">
+          <a:scrgbClr r="0" g="0" b="0"/>
+        </a:effectRef>
+        <a:fontRef idx="minor"/>
+      </dsp:style>
+      <dsp:txBody>
+        <a:bodyPr spcFirstLastPara="0" vert="horz" wrap="square" lIns="102870" tIns="102870" rIns="102870" bIns="102870" numCol="1" spcCol="1270" anchor="t" anchorCtr="0">
+          <a:noAutofit/>
+        </a:bodyPr>
+        <a:lstStyle/>
+        <a:p>
+          <a:pPr lvl="0" algn="l" defTabSz="1200150">
+            <a:lnSpc>
+              <a:spcPct val="90000"/>
+            </a:lnSpc>
+            <a:spcBef>
+              <a:spcPct val="0"/>
+            </a:spcBef>
+            <a:spcAft>
+              <a:spcPct val="35000"/>
+            </a:spcAft>
+          </a:pPr>
+          <a:r>
+            <a:rPr lang="en-US" sz="2700" b="0" i="0" kern="1200"/>
+            <a:t>TensorFlow Implementation of random forest. </a:t>
+          </a:r>
+          <a:endParaRPr lang="en-US" sz="2700" kern="1200"/>
+        </a:p>
+      </dsp:txBody>
+      <dsp:txXfrm>
+        <a:off x="0" y="1232182"/>
+        <a:ext cx="6116795" cy="1232182"/>
+      </dsp:txXfrm>
+    </dsp:sp>
+    <dsp:sp modelId="{D678CC4A-2ABD-8F4C-8479-2C29D00B7CC3}">
+      <dsp:nvSpPr>
+        <dsp:cNvPr id="0" name=""/>
+        <dsp:cNvSpPr/>
+      </dsp:nvSpPr>
+      <dsp:spPr>
+        <a:xfrm>
+          <a:off x="0" y="2464363"/>
+          <a:ext cx="6116795" cy="0"/>
+        </a:xfrm>
+        <a:prstGeom prst="line">
+          <a:avLst/>
+        </a:prstGeom>
+        <a:solidFill>
+          <a:schemeClr val="accent2">
+            <a:hueOff val="-13177148"/>
+            <a:satOff val="601"/>
+            <a:lumOff val="0"/>
+            <a:alphaOff val="0"/>
+          </a:schemeClr>
+        </a:solidFill>
+        <a:ln w="19050" cap="rnd" cmpd="sng" algn="ctr">
+          <a:solidFill>
+            <a:schemeClr val="accent2">
+              <a:hueOff val="-13177148"/>
+              <a:satOff val="601"/>
+              <a:lumOff val="0"/>
+              <a:alphaOff val="0"/>
+            </a:schemeClr>
+          </a:solidFill>
+          <a:prstDash val="solid"/>
+        </a:ln>
+        <a:effectLst/>
+      </dsp:spPr>
+      <dsp:style>
+        <a:lnRef idx="2">
+          <a:scrgbClr r="0" g="0" b="0"/>
+        </a:lnRef>
+        <a:fillRef idx="1">
+          <a:scrgbClr r="0" g="0" b="0"/>
+        </a:fillRef>
+        <a:effectRef idx="0">
+          <a:scrgbClr r="0" g="0" b="0"/>
+        </a:effectRef>
+        <a:fontRef idx="minor">
+          <a:schemeClr val="lt1"/>
+        </a:fontRef>
+      </dsp:style>
+    </dsp:sp>
+    <dsp:sp modelId="{67D8BE1B-E8AF-7F4A-B54E-86BF10688827}">
+      <dsp:nvSpPr>
+        <dsp:cNvPr id="0" name=""/>
+        <dsp:cNvSpPr/>
+      </dsp:nvSpPr>
+      <dsp:spPr>
+        <a:xfrm>
+          <a:off x="0" y="2464364"/>
+          <a:ext cx="6116795" cy="1232182"/>
+        </a:xfrm>
+        <a:prstGeom prst="rect">
+          <a:avLst/>
+        </a:prstGeom>
+        <a:noFill/>
+        <a:ln>
+          <a:noFill/>
+        </a:ln>
+        <a:effectLst/>
+      </dsp:spPr>
+      <dsp:style>
+        <a:lnRef idx="0">
+          <a:scrgbClr r="0" g="0" b="0"/>
+        </a:lnRef>
+        <a:fillRef idx="0">
+          <a:scrgbClr r="0" g="0" b="0"/>
+        </a:fillRef>
+        <a:effectRef idx="0">
+          <a:scrgbClr r="0" g="0" b="0"/>
+        </a:effectRef>
+        <a:fontRef idx="minor"/>
+      </dsp:style>
+      <dsp:txBody>
+        <a:bodyPr spcFirstLastPara="0" vert="horz" wrap="square" lIns="102870" tIns="102870" rIns="102870" bIns="102870" numCol="1" spcCol="1270" anchor="t" anchorCtr="0">
+          <a:noAutofit/>
+        </a:bodyPr>
+        <a:lstStyle/>
+        <a:p>
+          <a:pPr lvl="0" algn="l" defTabSz="1200150">
+            <a:lnSpc>
+              <a:spcPct val="90000"/>
+            </a:lnSpc>
+            <a:spcBef>
+              <a:spcPct val="0"/>
+            </a:spcBef>
+            <a:spcAft>
+              <a:spcPct val="35000"/>
+            </a:spcAft>
+          </a:pPr>
+          <a:r>
+            <a:rPr lang="en-US" sz="2700" b="0" i="0" kern="1200"/>
+            <a:t>Tensorflow implementation on multiple nodes.</a:t>
+          </a:r>
+          <a:endParaRPr lang="en-US" sz="2700" kern="1200"/>
+        </a:p>
+      </dsp:txBody>
+      <dsp:txXfrm>
+        <a:off x="0" y="2464364"/>
+        <a:ext cx="6116795" cy="1232182"/>
+      </dsp:txXfrm>
+    </dsp:sp>
+    <dsp:sp modelId="{70AB2AB2-6309-E248-9CB3-609E02B58EF6}">
+      <dsp:nvSpPr>
+        <dsp:cNvPr id="0" name=""/>
+        <dsp:cNvSpPr/>
+      </dsp:nvSpPr>
+      <dsp:spPr>
+        <a:xfrm>
+          <a:off x="0" y="3696545"/>
+          <a:ext cx="6116795" cy="0"/>
+        </a:xfrm>
+        <a:prstGeom prst="line">
+          <a:avLst/>
+        </a:prstGeom>
+        <a:solidFill>
+          <a:schemeClr val="accent2">
+            <a:hueOff val="-19765721"/>
+            <a:satOff val="901"/>
+            <a:lumOff val="0"/>
+            <a:alphaOff val="0"/>
+          </a:schemeClr>
+        </a:solidFill>
+        <a:ln w="19050" cap="rnd" cmpd="sng" algn="ctr">
+          <a:solidFill>
+            <a:schemeClr val="accent2">
+              <a:hueOff val="-19765721"/>
+              <a:satOff val="901"/>
+              <a:lumOff val="0"/>
+              <a:alphaOff val="0"/>
+            </a:schemeClr>
+          </a:solidFill>
+          <a:prstDash val="solid"/>
+        </a:ln>
+        <a:effectLst/>
+      </dsp:spPr>
+      <dsp:style>
+        <a:lnRef idx="2">
+          <a:scrgbClr r="0" g="0" b="0"/>
+        </a:lnRef>
+        <a:fillRef idx="1">
+          <a:scrgbClr r="0" g="0" b="0"/>
+        </a:fillRef>
+        <a:effectRef idx="0">
+          <a:scrgbClr r="0" g="0" b="0"/>
+        </a:effectRef>
+        <a:fontRef idx="minor">
+          <a:schemeClr val="lt1"/>
+        </a:fontRef>
+      </dsp:style>
+    </dsp:sp>
+    <dsp:sp modelId="{64853A4E-A5BC-6646-888C-52FF13580E5B}">
+      <dsp:nvSpPr>
+        <dsp:cNvPr id="0" name=""/>
+        <dsp:cNvSpPr/>
+      </dsp:nvSpPr>
+      <dsp:spPr>
+        <a:xfrm>
+          <a:off x="0" y="3696546"/>
+          <a:ext cx="6116795" cy="1232182"/>
+        </a:xfrm>
+        <a:prstGeom prst="rect">
+          <a:avLst/>
+        </a:prstGeom>
+        <a:noFill/>
+        <a:ln>
+          <a:noFill/>
+        </a:ln>
+        <a:effectLst/>
+      </dsp:spPr>
+      <dsp:style>
+        <a:lnRef idx="0">
+          <a:scrgbClr r="0" g="0" b="0"/>
+        </a:lnRef>
+        <a:fillRef idx="0">
+          <a:scrgbClr r="0" g="0" b="0"/>
+        </a:fillRef>
+        <a:effectRef idx="0">
+          <a:scrgbClr r="0" g="0" b="0"/>
+        </a:effectRef>
+        <a:fontRef idx="minor"/>
+      </dsp:style>
+      <dsp:txBody>
+        <a:bodyPr spcFirstLastPara="0" vert="horz" wrap="square" lIns="102870" tIns="102870" rIns="102870" bIns="102870" numCol="1" spcCol="1270" anchor="t" anchorCtr="0">
+          <a:noAutofit/>
+        </a:bodyPr>
+        <a:lstStyle/>
+        <a:p>
+          <a:pPr lvl="0" algn="l" defTabSz="1200150">
+            <a:lnSpc>
+              <a:spcPct val="90000"/>
+            </a:lnSpc>
+            <a:spcBef>
+              <a:spcPct val="0"/>
+            </a:spcBef>
+            <a:spcAft>
+              <a:spcPct val="35000"/>
+            </a:spcAft>
+          </a:pPr>
+          <a:r>
+            <a:rPr lang="en-US" sz="2700" b="0" i="0" kern="1200"/>
+            <a:t>Comparing performance between them.</a:t>
+          </a:r>
+          <a:endParaRPr lang="en-US" sz="2700" kern="1200"/>
+        </a:p>
+      </dsp:txBody>
+      <dsp:txXfrm>
+        <a:off x="0" y="3696546"/>
+        <a:ext cx="6116795" cy="1232182"/>
+      </dsp:txXfrm>
+    </dsp:sp>
   </dsp:spTree>
 </dsp:drawing>
 </file>
@@ -16803,13 +17239,55 @@
               <a:t>tensorflow</a:t>
             </a:r>
             <a:r>
-              <a:rPr lang="en-US" dirty="0">
+              <a:rPr lang="en-US" dirty="0" smtClean="0">
                 <a:solidFill>
                   <a:schemeClr val="bg1"/>
                 </a:solidFill>
               </a:rPr>
               <a:t>.</a:t>
             </a:r>
+          </a:p>
+          <a:p>
+            <a:pPr marL="0" indent="0">
+              <a:buNone/>
+            </a:pPr>
+            <a:r>
+              <a:rPr lang="en-US" dirty="0" smtClean="0">
+                <a:solidFill>
+                  <a:schemeClr val="bg1"/>
+                </a:solidFill>
+              </a:rPr>
+              <a:t>Used </a:t>
+            </a:r>
+            <a:r>
+              <a:rPr lang="en-US" dirty="0" err="1" smtClean="0">
+                <a:solidFill>
+                  <a:schemeClr val="bg1"/>
+                </a:solidFill>
+              </a:rPr>
+              <a:t>Horovod</a:t>
+            </a:r>
+            <a:r>
+              <a:rPr lang="en-US" dirty="0" smtClean="0">
+                <a:solidFill>
+                  <a:schemeClr val="bg1"/>
+                </a:solidFill>
+              </a:rPr>
+              <a:t> and MPI </a:t>
+            </a:r>
+            <a:r>
+              <a:rPr lang="en-US" dirty="0" err="1" smtClean="0">
+                <a:solidFill>
+                  <a:schemeClr val="bg1"/>
+                </a:solidFill>
+              </a:rPr>
+              <a:t>AllGather</a:t>
+            </a:r>
+            <a:endParaRPr lang="en-US" dirty="0">
+              <a:solidFill>
+                <a:schemeClr val="bg1"/>
+              </a:solidFill>
+            </a:endParaRPr>
           </a:p>
           <a:p>
             <a:r>
@@ -16958,8 +17436,8 @@
         </p:blipFill>
         <p:spPr>
           <a:xfrm>
-            <a:off x="5995284" y="1497440"/>
-            <a:ext cx="5999667" cy="3584802"/>
+            <a:off x="6558474" y="1506584"/>
+            <a:ext cx="5436477" cy="3248296"/>
           </a:xfrm>
           <a:prstGeom prst="rect">
             <a:avLst/>
@@ -17152,14 +17630,46 @@
         </p:blipFill>
         <p:spPr>
           <a:xfrm>
-            <a:off x="1402114" y="1680632"/>
-            <a:ext cx="8354534" cy="4991834"/>
+            <a:off x="2270794" y="2429250"/>
+            <a:ext cx="7147526" cy="4270647"/>
           </a:xfrm>
           <a:prstGeom prst="rect">
             <a:avLst/>
           </a:prstGeom>
         </p:spPr>
       </p:pic>
+      <p:sp>
+        <p:nvSpPr>
+          <p:cNvPr id="3" name="Title 1"/>
+          <p:cNvSpPr>
+            <a:spLocks noGrp="1"/>
+          </p:cNvSpPr>
+          <p:nvPr>
+            <p:ph type="title"/>
+          </p:nvPr>
+        </p:nvSpPr>
+        <p:spPr>
+          <a:xfrm>
+            <a:off x="1154954" y="827364"/>
+            <a:ext cx="9589246" cy="853268"/>
+          </a:xfrm>
+        </p:spPr>
+        <p:txBody>
+          <a:bodyPr/>
+          <a:lstStyle/>
+          <a:p>
+            <a:r>
+              <a:rPr lang="en-IN" dirty="0" err="1" smtClean="0"/>
+              <a:t>Tensorflow</a:t>
+            </a:r>
+            <a:r>
+              <a:rPr lang="en-IN" dirty="0" smtClean="0"/>
+              <a:t>: Time taken vs number of  trees </a:t>
+            </a:r>
+            <a:endParaRPr lang="en-IN" dirty="0"/>
+          </a:p>
+        </p:txBody>
+      </p:sp>
     </p:spTree>
     <p:extLst>
       <p:ext uri="{BB962C8B-B14F-4D97-AF65-F5344CB8AC3E}">
@@ -18111,8 +18621,8 @@
         </p:blipFill>
         <p:spPr>
           <a:xfrm>
-            <a:off x="5771537" y="1547849"/>
-            <a:ext cx="5726345" cy="3762301"/>
+            <a:off x="6505336" y="1547849"/>
+            <a:ext cx="4992546" cy="3280183"/>
           </a:xfrm>
           <a:prstGeom prst="rect">
             <a:avLst/>
@@ -18232,14 +18742,61 @@
         </p:blipFill>
         <p:spPr>
           <a:xfrm>
-            <a:off x="2130552" y="1553383"/>
-            <a:ext cx="7102724" cy="4658441"/>
+            <a:off x="2880360" y="2384212"/>
+            <a:ext cx="5989320" cy="3928196"/>
           </a:xfrm>
           <a:prstGeom prst="rect">
             <a:avLst/>
           </a:prstGeom>
         </p:spPr>
       </p:pic>
+      <p:sp>
+        <p:nvSpPr>
+          <p:cNvPr id="3" name="Title 1"/>
+          <p:cNvSpPr>
+            <a:spLocks noGrp="1"/>
+          </p:cNvSpPr>
+          <p:nvPr>
+            <p:ph type="title"/>
+          </p:nvPr>
+        </p:nvSpPr>
+        <p:spPr>
+          <a:xfrm>
+            <a:off x="1154954" y="973668"/>
+            <a:ext cx="8761413" cy="706964"/>
+          </a:xfrm>
+        </p:spPr>
+        <p:txBody>
+          <a:bodyPr/>
+          <a:lstStyle/>
+          <a:p>
+            <a:r>
+              <a:rPr lang="en-IN" dirty="0" smtClean="0"/>
+              <a:t>Spark and </a:t>
+            </a:r>
+            <a:r>
+              <a:rPr lang="en-IN" dirty="0" err="1" smtClean="0"/>
+              <a:t>Tensorflow</a:t>
+            </a:r>
+            <a:r>
+              <a:rPr lang="en-IN" dirty="0" smtClean="0"/>
+              <a:t> </a:t>
+            </a:r>
+            <a:r>
+              <a:rPr lang="en-IN" dirty="0" err="1" smtClean="0"/>
+              <a:t>comparision</a:t>
+            </a:r>
+            <a:r>
+              <a:rPr lang="en-IN" dirty="0" smtClean="0"/>
+              <a:t/>
+            </a:r>
+            <a:br>
+              <a:rPr lang="en-IN" dirty="0" smtClean="0"/>
+            </a:br>
+            <a:endParaRPr lang="en-IN" dirty="0"/>
+          </a:p>
+        </p:txBody>
+      </p:sp>
     </p:spTree>
     <p:extLst>
       <p:ext uri="{BB962C8B-B14F-4D97-AF65-F5344CB8AC3E}">
@@ -20992,8 +21549,8 @@
           <a:lstStyle/>
           <a:p>
             <a:r>
-              <a:rPr lang="en-IN" b="1" dirty="0"/>
-              <a:t>Preliminary Results</a:t>
+              <a:rPr lang="en-IN" b="1" dirty="0" smtClean="0"/>
+              <a:t>Spark single node</a:t>
             </a:r>
             <a:r>
               <a:rPr lang="en-IN" dirty="0"/>
@@ -22962,8 +23519,8 @@
         </p:blipFill>
         <p:spPr>
           <a:xfrm>
-            <a:off x="6869550" y="2013535"/>
-            <a:ext cx="5117549" cy="3211260"/>
+            <a:off x="7223760" y="2013535"/>
+            <a:ext cx="4763339" cy="2988993"/>
           </a:xfrm>
           <a:prstGeom prst="rect">
             <a:avLst/>
@@ -23082,14 +23639,42 @@
         </p:blipFill>
         <p:spPr>
           <a:xfrm>
-            <a:off x="1352508" y="1161288"/>
-            <a:ext cx="8833908" cy="5432852"/>
+            <a:off x="2221188" y="2279426"/>
+            <a:ext cx="7151412" cy="4398117"/>
           </a:xfrm>
           <a:prstGeom prst="rect">
             <a:avLst/>
           </a:prstGeom>
         </p:spPr>
       </p:pic>
+      <p:sp>
+        <p:nvSpPr>
+          <p:cNvPr id="4" name="Title 1"/>
+          <p:cNvSpPr>
+            <a:spLocks noGrp="1"/>
+          </p:cNvSpPr>
+          <p:nvPr>
+            <p:ph type="title"/>
+          </p:nvPr>
+        </p:nvSpPr>
+        <p:spPr>
+          <a:xfrm>
+            <a:off x="1154954" y="818220"/>
+            <a:ext cx="8761413" cy="706964"/>
+          </a:xfrm>
+        </p:spPr>
+        <p:txBody>
+          <a:bodyPr/>
+          <a:lstStyle/>
+          <a:p>
+            <a:r>
+              <a:rPr lang="en-IN" dirty="0" smtClean="0"/>
+              <a:t>Spark: Time vs number of trees</a:t>
+            </a:r>
+            <a:endParaRPr lang="en-IN" dirty="0"/>
+          </a:p>
+        </p:txBody>
+      </p:sp>
     </p:spTree>
     <p:extLst>
       <p:ext uri="{BB962C8B-B14F-4D97-AF65-F5344CB8AC3E}">

</xml_diff>